<commit_message>
Poster has been completed.
Poster.final exe.print(Yay)
</commit_message>
<xml_diff>
--- a/UNO_Poster.pptx
+++ b/UNO_Poster.pptx
@@ -126,6 +126,131 @@
 </p:presentation>
 </file>
 
+<file path=ppt/revisionInfo.xml><?xml version="1.0" encoding="utf-8"?>
+<p1510:revInfo xmlns:a="http://schemas.openxmlformats.org/drawingml/2006/main" xmlns:r="http://schemas.openxmlformats.org/officeDocument/2006/relationships" xmlns:p1510="http://schemas.microsoft.com/office/powerpoint/2015/10/main">
+  <p1510:revLst>
+    <p1510:client id="{15466B4B-FD20-404D-B5CA-4C0763DB6751}" v="20" dt="2019-04-09T14:37:59.183"/>
+  </p1510:revLst>
+</p1510:revInfo>
+</file>
+
+<file path=ppt/changesInfos/changesInfo1.xml><?xml version="1.0" encoding="utf-8"?>
+<pc:chgInfo xmlns:a="http://schemas.openxmlformats.org/drawingml/2006/main" xmlns:r="http://schemas.openxmlformats.org/officeDocument/2006/relationships" xmlns:ac="http://schemas.microsoft.com/office/drawing/2013/main/command" xmlns:pc="http://schemas.microsoft.com/office/powerpoint/2013/main/command">
+  <pc:docChgLst>
+    <pc:chgData name="Rob Pennekamp" userId="6b0ec7c6a79f87b1" providerId="LiveId" clId="{15466B4B-FD20-404D-B5CA-4C0763DB6751}"/>
+    <pc:docChg chg="undo modSld">
+      <pc:chgData name="Rob Pennekamp" userId="6b0ec7c6a79f87b1" providerId="LiveId" clId="{15466B4B-FD20-404D-B5CA-4C0763DB6751}" dt="2019-04-09T14:38:13.665" v="328" actId="1076"/>
+      <pc:docMkLst>
+        <pc:docMk/>
+      </pc:docMkLst>
+      <pc:sldChg chg="addSp delSp modSp">
+        <pc:chgData name="Rob Pennekamp" userId="6b0ec7c6a79f87b1" providerId="LiveId" clId="{15466B4B-FD20-404D-B5CA-4C0763DB6751}" dt="2019-04-09T14:38:13.665" v="328" actId="1076"/>
+        <pc:sldMkLst>
+          <pc:docMk/>
+          <pc:sldMk cId="0" sldId="256"/>
+        </pc:sldMkLst>
+        <pc:spChg chg="mod">
+          <ac:chgData name="Rob Pennekamp" userId="6b0ec7c6a79f87b1" providerId="LiveId" clId="{15466B4B-FD20-404D-B5CA-4C0763DB6751}" dt="2019-04-09T14:31:20.236" v="26" actId="20577"/>
+          <ac:spMkLst>
+            <pc:docMk/>
+            <pc:sldMk cId="0" sldId="256"/>
+            <ac:spMk id="3" creationId="{00000000-0000-0000-0000-000000000000}"/>
+          </ac:spMkLst>
+        </pc:spChg>
+        <pc:spChg chg="add del">
+          <ac:chgData name="Rob Pennekamp" userId="6b0ec7c6a79f87b1" providerId="LiveId" clId="{15466B4B-FD20-404D-B5CA-4C0763DB6751}" dt="2019-04-09T14:32:47.989" v="30" actId="478"/>
+          <ac:spMkLst>
+            <pc:docMk/>
+            <pc:sldMk cId="0" sldId="256"/>
+            <ac:spMk id="7" creationId="{72C5A024-B457-4917-8940-3E00B52A3331}"/>
+          </ac:spMkLst>
+        </pc:spChg>
+        <pc:spChg chg="add del mod">
+          <ac:chgData name="Rob Pennekamp" userId="6b0ec7c6a79f87b1" providerId="LiveId" clId="{15466B4B-FD20-404D-B5CA-4C0763DB6751}" dt="2019-04-09T14:33:02.265" v="34" actId="478"/>
+          <ac:spMkLst>
+            <pc:docMk/>
+            <pc:sldMk cId="0" sldId="256"/>
+            <ac:spMk id="8" creationId="{4B0DA4D9-7F64-4878-90D6-06CFA0BB2A44}"/>
+          </ac:spMkLst>
+        </pc:spChg>
+        <pc:spChg chg="add mod">
+          <ac:chgData name="Rob Pennekamp" userId="6b0ec7c6a79f87b1" providerId="LiveId" clId="{15466B4B-FD20-404D-B5CA-4C0763DB6751}" dt="2019-04-09T14:37:59.180" v="326" actId="207"/>
+          <ac:spMkLst>
+            <pc:docMk/>
+            <pc:sldMk cId="0" sldId="256"/>
+            <ac:spMk id="11" creationId="{E18F2302-C61B-4D0F-A997-BA8043350ADF}"/>
+          </ac:spMkLst>
+        </pc:spChg>
+        <pc:spChg chg="mod">
+          <ac:chgData name="Rob Pennekamp" userId="6b0ec7c6a79f87b1" providerId="LiveId" clId="{15466B4B-FD20-404D-B5CA-4C0763DB6751}" dt="2019-04-09T14:36:45.851" v="315" actId="1076"/>
+          <ac:spMkLst>
+            <pc:docMk/>
+            <pc:sldMk cId="0" sldId="256"/>
+            <ac:spMk id="17" creationId="{33D0EA36-EB46-4F85-BFC5-002780B198B9}"/>
+          </ac:spMkLst>
+        </pc:spChg>
+        <pc:spChg chg="mod">
+          <ac:chgData name="Rob Pennekamp" userId="6b0ec7c6a79f87b1" providerId="LiveId" clId="{15466B4B-FD20-404D-B5CA-4C0763DB6751}" dt="2019-04-09T14:31:22.969" v="28" actId="20577"/>
+          <ac:spMkLst>
+            <pc:docMk/>
+            <pc:sldMk cId="0" sldId="256"/>
+            <ac:spMk id="20" creationId="{A3728D71-5EA2-4DB9-821C-5A7851FA097C}"/>
+          </ac:spMkLst>
+        </pc:spChg>
+        <pc:spChg chg="mod">
+          <ac:chgData name="Rob Pennekamp" userId="6b0ec7c6a79f87b1" providerId="LiveId" clId="{15466B4B-FD20-404D-B5CA-4C0763DB6751}" dt="2019-04-09T14:37:27.802" v="320" actId="1076"/>
+          <ac:spMkLst>
+            <pc:docMk/>
+            <pc:sldMk cId="0" sldId="256"/>
+            <ac:spMk id="61" creationId="{00000000-0000-0000-0000-000000000000}"/>
+          </ac:spMkLst>
+        </pc:spChg>
+        <pc:picChg chg="mod">
+          <ac:chgData name="Rob Pennekamp" userId="6b0ec7c6a79f87b1" providerId="LiveId" clId="{15466B4B-FD20-404D-B5CA-4C0763DB6751}" dt="2019-04-09T14:38:08.009" v="327" actId="1076"/>
+          <ac:picMkLst>
+            <pc:docMk/>
+            <pc:sldMk cId="0" sldId="256"/>
+            <ac:picMk id="2" creationId="{00000000-0000-0000-0000-000000000000}"/>
+          </ac:picMkLst>
+        </pc:picChg>
+        <pc:picChg chg="mod">
+          <ac:chgData name="Rob Pennekamp" userId="6b0ec7c6a79f87b1" providerId="LiveId" clId="{15466B4B-FD20-404D-B5CA-4C0763DB6751}" dt="2019-04-09T14:38:08.009" v="327" actId="1076"/>
+          <ac:picMkLst>
+            <pc:docMk/>
+            <pc:sldMk cId="0" sldId="256"/>
+            <ac:picMk id="4" creationId="{00000000-0000-0000-0000-000000000000}"/>
+          </ac:picMkLst>
+        </pc:picChg>
+        <pc:picChg chg="mod">
+          <ac:chgData name="Rob Pennekamp" userId="6b0ec7c6a79f87b1" providerId="LiveId" clId="{15466B4B-FD20-404D-B5CA-4C0763DB6751}" dt="2019-04-09T14:38:08.009" v="327" actId="1076"/>
+          <ac:picMkLst>
+            <pc:docMk/>
+            <pc:sldMk cId="0" sldId="256"/>
+            <ac:picMk id="6" creationId="{00000000-0000-0000-0000-000000000000}"/>
+          </ac:picMkLst>
+        </pc:picChg>
+        <pc:picChg chg="add mod">
+          <ac:chgData name="Rob Pennekamp" userId="6b0ec7c6a79f87b1" providerId="LiveId" clId="{15466B4B-FD20-404D-B5CA-4C0763DB6751}" dt="2019-04-09T14:38:13.665" v="328" actId="1076"/>
+          <ac:picMkLst>
+            <pc:docMk/>
+            <pc:sldMk cId="0" sldId="256"/>
+            <ac:picMk id="9" creationId="{0F5F8CF1-2A15-4B40-87DC-8CFD832767FE}"/>
+          </ac:picMkLst>
+        </pc:picChg>
+        <pc:picChg chg="add del">
+          <ac:chgData name="Rob Pennekamp" userId="6b0ec7c6a79f87b1" providerId="LiveId" clId="{15466B4B-FD20-404D-B5CA-4C0763DB6751}" dt="2019-04-09T14:34:36.865" v="55"/>
+          <ac:picMkLst>
+            <pc:docMk/>
+            <pc:sldMk cId="0" sldId="256"/>
+            <ac:picMk id="14" creationId="{C1E01E3F-C0F0-4A2A-B56A-7A802922F57A}"/>
+          </ac:picMkLst>
+        </pc:picChg>
+      </pc:sldChg>
+    </pc:docChg>
+  </pc:docChgLst>
+</pc:chgInfo>
+</file>
+
 <file path=ppt/notesMasters/notesMaster1.xml><?xml version="1.0" encoding="utf-8"?>
 <p:notesMaster xmlns:a="http://schemas.openxmlformats.org/drawingml/2006/main" xmlns:r="http://schemas.openxmlformats.org/officeDocument/2006/relationships" xmlns:p="http://schemas.openxmlformats.org/presentationml/2006/main">
   <p:cSld>
@@ -366,7 +491,7 @@
           <a:p>
             <a:fld id="{3BE81A27-1440-C343-B73A-EDC558E67D24}" type="slidenum">
               <a:rPr lang="nl-NL" smtClean="0"/>
-              <a:t>‹#›</a:t>
+              <a:t>‹nr.›</a:t>
             </a:fld>
             <a:endParaRPr lang="nl-NL"/>
           </a:p>
@@ -662,7 +787,7 @@
           <a:p>
             <a:fld id="{83473042-6688-F148-AA6B-B0D689358453}" type="slidenum">
               <a:rPr lang="nl-NL" smtClean="0"/>
-              <a:t>‹#›</a:t>
+              <a:t>‹nr.›</a:t>
             </a:fld>
             <a:endParaRPr lang="nl-NL"/>
           </a:p>
@@ -2482,7 +2607,7 @@
                 <a:latin typeface="Verdana" panose="020B0604030504040204" pitchFamily="34" charset="0"/>
                 <a:ea typeface="Verdana" panose="020B0604030504040204" pitchFamily="34" charset="0"/>
               </a:rPr>
-              <a:t>Barplot</a:t>
+              <a:t>Figure</a:t>
             </a:r>
             <a:r>
               <a:rPr lang="nl-NL" sz="1800" b="1" dirty="0">
@@ -2668,8 +2793,8 @@
         </p:blipFill>
         <p:spPr>
           <a:xfrm>
-            <a:off x="1218895" y="16521411"/>
-            <a:ext cx="2775553" cy="1740204"/>
+            <a:off x="1274627" y="15710040"/>
+            <a:ext cx="2219118" cy="1740204"/>
           </a:xfrm>
           <a:prstGeom prst="rect">
             <a:avLst/>
@@ -2691,8 +2816,8 @@
         </p:blipFill>
         <p:spPr>
           <a:xfrm>
-            <a:off x="3995068" y="16476171"/>
-            <a:ext cx="2708290" cy="1786318"/>
+            <a:off x="3503915" y="15664800"/>
+            <a:ext cx="2165340" cy="1786318"/>
           </a:xfrm>
           <a:prstGeom prst="rect">
             <a:avLst/>
@@ -2714,8 +2839,8 @@
         </p:blipFill>
         <p:spPr>
           <a:xfrm>
-            <a:off x="6703358" y="16485895"/>
-            <a:ext cx="1656184" cy="1795994"/>
+            <a:off x="5669255" y="15655124"/>
+            <a:ext cx="1324157" cy="1795994"/>
           </a:xfrm>
           <a:prstGeom prst="rect">
             <a:avLst/>
@@ -2736,8 +2861,8 @@
         </p:nvSpPr>
         <p:spPr>
           <a:xfrm>
-            <a:off x="980092" y="20066712"/>
-            <a:ext cx="9351680" cy="7466146"/>
+            <a:off x="980092" y="22398665"/>
+            <a:ext cx="9351680" cy="5189626"/>
           </a:xfrm>
           <a:prstGeom prst="rect">
             <a:avLst/>
@@ -2836,7 +2961,7 @@
               <a:rPr lang="en-GB" sz="1800" dirty="0">
                 <a:latin typeface="Verdana" panose="020B0604030504040204"/>
               </a:rPr>
-              <a:t>Differences between men and women are often small, but existent nonetheless. Remarkably, men use internet more frequently than women in all but one category: social media. </a:t>
+              <a:t>One of the other graphs shows that people with a higher level of education use the internet more frequently on a smartphone. However, internet usage within amusement categories seems more popular with people who have followed medium level education.</a:t>
             </a:r>
           </a:p>
           <a:p>
@@ -2859,63 +2984,7 @@
               <a:rPr lang="en-GB" sz="1800" dirty="0">
                 <a:latin typeface="Verdana" panose="020B0604030504040204"/>
               </a:rPr>
-              <a:t>One of the other graphs shows that people with a higher level of education use the internet more frequently on a smartphone. However, internet usage within amusement categories seems more popular with people who have followed medium level education.</a:t>
-            </a:r>
-          </a:p>
-          <a:p>
-            <a:pPr>
-              <a:lnSpc>
-                <a:spcPts val="2545"/>
-              </a:lnSpc>
-            </a:pPr>
-            <a:endParaRPr lang="en-GB" sz="1800" dirty="0">
-              <a:latin typeface="Verdana" panose="020B0604030504040204"/>
-            </a:endParaRPr>
-          </a:p>
-          <a:p>
-            <a:pPr>
-              <a:lnSpc>
-                <a:spcPts val="2545"/>
-              </a:lnSpc>
-            </a:pPr>
-            <a:r>
-              <a:rPr lang="en-GB" sz="1800" dirty="0">
-                <a:latin typeface="Verdana" panose="020B0604030504040204"/>
-              </a:rPr>
               <a:t>As we expected, internet usage for entertainments sake is less frequent with people working full-time. When talking about entertainment, one can think of activities such as playing games or downloading and streaming movies, music or tv-shows.</a:t>
-            </a:r>
-          </a:p>
-          <a:p>
-            <a:pPr>
-              <a:lnSpc>
-                <a:spcPts val="2545"/>
-              </a:lnSpc>
-            </a:pPr>
-            <a:endParaRPr lang="en-GB" sz="2400" dirty="0">
-              <a:latin typeface="Verdana" panose="020B0604030504040204"/>
-            </a:endParaRPr>
-          </a:p>
-          <a:p>
-            <a:pPr>
-              <a:lnSpc>
-                <a:spcPts val="2545"/>
-              </a:lnSpc>
-            </a:pPr>
-            <a:endParaRPr lang="en-GB" sz="2400" dirty="0">
-              <a:latin typeface="Verdana" panose="020B0604030504040204"/>
-            </a:endParaRPr>
-          </a:p>
-          <a:p>
-            <a:pPr>
-              <a:lnSpc>
-                <a:spcPts val="2545"/>
-              </a:lnSpc>
-            </a:pPr>
-            <a:r>
-              <a:rPr lang="en-GB" sz="2400" dirty="0">
-                <a:latin typeface="Verdana" panose="020B0604030504040204"/>
-              </a:rPr>
-              <a:t> </a:t>
             </a:r>
           </a:p>
         </p:txBody>
@@ -3407,7 +3476,7 @@
         </p:nvSpPr>
         <p:spPr>
           <a:xfrm>
-            <a:off x="1218895" y="18365750"/>
+            <a:off x="1187145" y="17602777"/>
             <a:ext cx="7513367" cy="1107996"/>
           </a:xfrm>
           <a:prstGeom prst="rect">
@@ -3439,7 +3508,7 @@
                 <a:latin typeface="Verdana" panose="020B0604030504040204" pitchFamily="34" charset="0"/>
                 <a:ea typeface="Verdana" panose="020B0604030504040204" pitchFamily="34" charset="0"/>
               </a:rPr>
-              <a:t> 1:</a:t>
+              <a:t> 2:</a:t>
             </a:r>
           </a:p>
           <a:p>
@@ -3799,6 +3868,506 @@
                 <a:schemeClr val="tx1">
                   <a:lumMod val="50000"/>
                   <a:lumOff val="50000"/>
+                </a:schemeClr>
+              </a:solidFill>
+              <a:latin typeface="Verdana" panose="020B0604030504040204" pitchFamily="34" charset="0"/>
+              <a:ea typeface="Verdana" panose="020B0604030504040204" pitchFamily="34" charset="0"/>
+            </a:endParaRPr>
+          </a:p>
+        </p:txBody>
+      </p:sp>
+      <p:pic>
+        <p:nvPicPr>
+          <p:cNvPr id="9" name="Afbeelding 8">
+            <a:extLst>
+              <a:ext uri="{FF2B5EF4-FFF2-40B4-BE49-F238E27FC236}">
+                <a16:creationId xmlns:a16="http://schemas.microsoft.com/office/drawing/2014/main" id="{0F5F8CF1-2A15-4B40-87DC-8CFD832767FE}"/>
+              </a:ext>
+            </a:extLst>
+          </p:cNvPr>
+          <p:cNvPicPr>
+            <a:picLocks noChangeAspect="1"/>
+          </p:cNvPicPr>
+          <p:nvPr/>
+        </p:nvPicPr>
+        <p:blipFill>
+          <a:blip r:embed="rId8"/>
+          <a:stretch>
+            <a:fillRect/>
+          </a:stretch>
+        </p:blipFill>
+        <p:spPr>
+          <a:xfrm>
+            <a:off x="1156978" y="18914545"/>
+            <a:ext cx="5696039" cy="2439302"/>
+          </a:xfrm>
+          <a:prstGeom prst="rect">
+            <a:avLst/>
+          </a:prstGeom>
+        </p:spPr>
+      </p:pic>
+      <p:sp>
+        <p:nvSpPr>
+          <p:cNvPr id="11" name="Tekstvak 10">
+            <a:extLst>
+              <a:ext uri="{FF2B5EF4-FFF2-40B4-BE49-F238E27FC236}">
+                <a16:creationId xmlns:a16="http://schemas.microsoft.com/office/drawing/2014/main" id="{E18F2302-C61B-4D0F-A997-BA8043350ADF}"/>
+              </a:ext>
+            </a:extLst>
+          </p:cNvPr>
+          <p:cNvSpPr txBox="1"/>
+          <p:nvPr/>
+        </p:nvSpPr>
+        <p:spPr>
+          <a:xfrm>
+            <a:off x="1187145" y="21353847"/>
+            <a:ext cx="7272419" cy="1107996"/>
+          </a:xfrm>
+          <a:prstGeom prst="rect">
+            <a:avLst/>
+          </a:prstGeom>
+          <a:noFill/>
+        </p:spPr>
+        <p:txBody>
+          <a:bodyPr wrap="square" rtlCol="0">
+            <a:spAutoFit/>
+          </a:bodyPr>
+          <a:lstStyle/>
+          <a:p>
+            <a:r>
+              <a:rPr lang="nl-NL" sz="1800" b="1" dirty="0" err="1">
+                <a:solidFill>
+                  <a:schemeClr val="tx2"/>
+                </a:solidFill>
+                <a:latin typeface="Verdana" panose="020B0604030504040204" pitchFamily="34" charset="0"/>
+                <a:ea typeface="Verdana" panose="020B0604030504040204" pitchFamily="34" charset="0"/>
+              </a:rPr>
+              <a:t>Figure</a:t>
+            </a:r>
+            <a:r>
+              <a:rPr lang="nl-NL" sz="1800" b="1" dirty="0">
+                <a:solidFill>
+                  <a:schemeClr val="tx2"/>
+                </a:solidFill>
+                <a:latin typeface="Verdana" panose="020B0604030504040204" pitchFamily="34" charset="0"/>
+                <a:ea typeface="Verdana" panose="020B0604030504040204" pitchFamily="34" charset="0"/>
+              </a:rPr>
+              <a:t> 3:</a:t>
+            </a:r>
+          </a:p>
+          <a:p>
+            <a:r>
+              <a:rPr lang="nl-NL" sz="1600" dirty="0" err="1">
+                <a:solidFill>
+                  <a:schemeClr val="bg1">
+                    <a:lumMod val="50000"/>
+                  </a:schemeClr>
+                </a:solidFill>
+                <a:latin typeface="Verdana" panose="020B0604030504040204" pitchFamily="34" charset="0"/>
+                <a:ea typeface="Verdana" panose="020B0604030504040204" pitchFamily="34" charset="0"/>
+              </a:rPr>
+              <a:t>Graph</a:t>
+            </a:r>
+            <a:r>
+              <a:rPr lang="nl-NL" sz="1600" dirty="0">
+                <a:solidFill>
+                  <a:schemeClr val="bg1">
+                    <a:lumMod val="50000"/>
+                  </a:schemeClr>
+                </a:solidFill>
+                <a:latin typeface="Verdana" panose="020B0604030504040204" pitchFamily="34" charset="0"/>
+                <a:ea typeface="Verdana" panose="020B0604030504040204" pitchFamily="34" charset="0"/>
+              </a:rPr>
+              <a:t> </a:t>
+            </a:r>
+            <a:r>
+              <a:rPr lang="nl-NL" sz="1600" dirty="0" err="1">
+                <a:solidFill>
+                  <a:schemeClr val="bg1">
+                    <a:lumMod val="50000"/>
+                  </a:schemeClr>
+                </a:solidFill>
+                <a:latin typeface="Verdana" panose="020B0604030504040204" pitchFamily="34" charset="0"/>
+                <a:ea typeface="Verdana" panose="020B0604030504040204" pitchFamily="34" charset="0"/>
+              </a:rPr>
+              <a:t>that</a:t>
+            </a:r>
+            <a:r>
+              <a:rPr lang="nl-NL" sz="1600" dirty="0">
+                <a:solidFill>
+                  <a:schemeClr val="bg1">
+                    <a:lumMod val="50000"/>
+                  </a:schemeClr>
+                </a:solidFill>
+                <a:latin typeface="Verdana" panose="020B0604030504040204" pitchFamily="34" charset="0"/>
+                <a:ea typeface="Verdana" panose="020B0604030504040204" pitchFamily="34" charset="0"/>
+              </a:rPr>
+              <a:t> shows </a:t>
+            </a:r>
+            <a:r>
+              <a:rPr lang="nl-NL" sz="1600" dirty="0" err="1">
+                <a:solidFill>
+                  <a:schemeClr val="bg1">
+                    <a:lumMod val="50000"/>
+                  </a:schemeClr>
+                </a:solidFill>
+                <a:latin typeface="Verdana" panose="020B0604030504040204" pitchFamily="34" charset="0"/>
+                <a:ea typeface="Verdana" panose="020B0604030504040204" pitchFamily="34" charset="0"/>
+              </a:rPr>
+              <a:t>the</a:t>
+            </a:r>
+            <a:r>
+              <a:rPr lang="nl-NL" sz="1600" dirty="0">
+                <a:solidFill>
+                  <a:schemeClr val="bg1">
+                    <a:lumMod val="50000"/>
+                  </a:schemeClr>
+                </a:solidFill>
+                <a:latin typeface="Verdana" panose="020B0604030504040204" pitchFamily="34" charset="0"/>
+                <a:ea typeface="Verdana" panose="020B0604030504040204" pitchFamily="34" charset="0"/>
+              </a:rPr>
+              <a:t> percentage of </a:t>
+            </a:r>
+            <a:r>
+              <a:rPr lang="nl-NL" sz="1600" dirty="0" err="1">
+                <a:solidFill>
+                  <a:schemeClr val="bg1">
+                    <a:lumMod val="50000"/>
+                  </a:schemeClr>
+                </a:solidFill>
+                <a:latin typeface="Verdana" panose="020B0604030504040204" pitchFamily="34" charset="0"/>
+                <a:ea typeface="Verdana" panose="020B0604030504040204" pitchFamily="34" charset="0"/>
+              </a:rPr>
+              <a:t>people</a:t>
+            </a:r>
+            <a:r>
+              <a:rPr lang="nl-NL" sz="1600" dirty="0">
+                <a:solidFill>
+                  <a:schemeClr val="bg1">
+                    <a:lumMod val="50000"/>
+                  </a:schemeClr>
+                </a:solidFill>
+                <a:latin typeface="Verdana" panose="020B0604030504040204" pitchFamily="34" charset="0"/>
+                <a:ea typeface="Verdana" panose="020B0604030504040204" pitchFamily="34" charset="0"/>
+              </a:rPr>
+              <a:t> </a:t>
+            </a:r>
+            <a:r>
+              <a:rPr lang="nl-NL" sz="1600" dirty="0" err="1">
+                <a:solidFill>
+                  <a:schemeClr val="bg1">
+                    <a:lumMod val="50000"/>
+                  </a:schemeClr>
+                </a:solidFill>
+                <a:latin typeface="Verdana" panose="020B0604030504040204" pitchFamily="34" charset="0"/>
+                <a:ea typeface="Verdana" panose="020B0604030504040204" pitchFamily="34" charset="0"/>
+              </a:rPr>
+              <a:t>within</a:t>
+            </a:r>
+            <a:r>
+              <a:rPr lang="nl-NL" sz="1600" dirty="0">
+                <a:solidFill>
+                  <a:schemeClr val="bg1">
+                    <a:lumMod val="50000"/>
+                  </a:schemeClr>
+                </a:solidFill>
+                <a:latin typeface="Verdana" panose="020B0604030504040204" pitchFamily="34" charset="0"/>
+                <a:ea typeface="Verdana" panose="020B0604030504040204" pitchFamily="34" charset="0"/>
+              </a:rPr>
+              <a:t> </a:t>
+            </a:r>
+            <a:r>
+              <a:rPr lang="nl-NL" sz="1600" dirty="0" err="1">
+                <a:solidFill>
+                  <a:schemeClr val="bg1">
+                    <a:lumMod val="50000"/>
+                  </a:schemeClr>
+                </a:solidFill>
+                <a:latin typeface="Verdana" panose="020B0604030504040204" pitchFamily="34" charset="0"/>
+                <a:ea typeface="Verdana" panose="020B0604030504040204" pitchFamily="34" charset="0"/>
+              </a:rPr>
+              <a:t>paygrades</a:t>
+            </a:r>
+            <a:r>
+              <a:rPr lang="nl-NL" sz="1600" dirty="0">
+                <a:solidFill>
+                  <a:schemeClr val="bg1">
+                    <a:lumMod val="50000"/>
+                  </a:schemeClr>
+                </a:solidFill>
+                <a:latin typeface="Verdana" panose="020B0604030504040204" pitchFamily="34" charset="0"/>
+                <a:ea typeface="Verdana" panose="020B0604030504040204" pitchFamily="34" charset="0"/>
+              </a:rPr>
+              <a:t> </a:t>
+            </a:r>
+            <a:r>
+              <a:rPr lang="nl-NL" sz="1600" dirty="0" err="1">
+                <a:solidFill>
+                  <a:schemeClr val="bg1">
+                    <a:lumMod val="50000"/>
+                  </a:schemeClr>
+                </a:solidFill>
+                <a:latin typeface="Verdana" panose="020B0604030504040204" pitchFamily="34" charset="0"/>
+                <a:ea typeface="Verdana" panose="020B0604030504040204" pitchFamily="34" charset="0"/>
+              </a:rPr>
+              <a:t>that</a:t>
+            </a:r>
+            <a:r>
+              <a:rPr lang="nl-NL" sz="1600" dirty="0">
+                <a:solidFill>
+                  <a:schemeClr val="bg1">
+                    <a:lumMod val="50000"/>
+                  </a:schemeClr>
+                </a:solidFill>
+                <a:latin typeface="Verdana" panose="020B0604030504040204" pitchFamily="34" charset="0"/>
+                <a:ea typeface="Verdana" panose="020B0604030504040204" pitchFamily="34" charset="0"/>
+              </a:rPr>
+              <a:t> </a:t>
+            </a:r>
+            <a:r>
+              <a:rPr lang="nl-NL" sz="1600" dirty="0" err="1">
+                <a:solidFill>
+                  <a:schemeClr val="bg1">
+                    <a:lumMod val="50000"/>
+                  </a:schemeClr>
+                </a:solidFill>
+                <a:latin typeface="Verdana" panose="020B0604030504040204" pitchFamily="34" charset="0"/>
+                <a:ea typeface="Verdana" panose="020B0604030504040204" pitchFamily="34" charset="0"/>
+              </a:rPr>
+              <a:t>use</a:t>
+            </a:r>
+            <a:r>
+              <a:rPr lang="nl-NL" sz="1600" dirty="0">
+                <a:solidFill>
+                  <a:schemeClr val="bg1">
+                    <a:lumMod val="50000"/>
+                  </a:schemeClr>
+                </a:solidFill>
+                <a:latin typeface="Verdana" panose="020B0604030504040204" pitchFamily="34" charset="0"/>
+                <a:ea typeface="Verdana" panose="020B0604030504040204" pitchFamily="34" charset="0"/>
+              </a:rPr>
+              <a:t> </a:t>
+            </a:r>
+            <a:r>
+              <a:rPr lang="nl-NL" sz="1600" dirty="0" err="1">
+                <a:solidFill>
+                  <a:schemeClr val="bg1">
+                    <a:lumMod val="50000"/>
+                  </a:schemeClr>
+                </a:solidFill>
+                <a:latin typeface="Verdana" panose="020B0604030504040204" pitchFamily="34" charset="0"/>
+                <a:ea typeface="Verdana" panose="020B0604030504040204" pitchFamily="34" charset="0"/>
+              </a:rPr>
+              <a:t>social</a:t>
+            </a:r>
+            <a:r>
+              <a:rPr lang="nl-NL" sz="1600" dirty="0">
+                <a:solidFill>
+                  <a:schemeClr val="bg1">
+                    <a:lumMod val="50000"/>
+                  </a:schemeClr>
+                </a:solidFill>
+                <a:latin typeface="Verdana" panose="020B0604030504040204" pitchFamily="34" charset="0"/>
+                <a:ea typeface="Verdana" panose="020B0604030504040204" pitchFamily="34" charset="0"/>
+              </a:rPr>
+              <a:t> media on a </a:t>
+            </a:r>
+            <a:r>
+              <a:rPr lang="nl-NL" sz="1600" dirty="0" err="1">
+                <a:solidFill>
+                  <a:schemeClr val="bg1">
+                    <a:lumMod val="50000"/>
+                  </a:schemeClr>
+                </a:solidFill>
+                <a:latin typeface="Verdana" panose="020B0604030504040204" pitchFamily="34" charset="0"/>
+                <a:ea typeface="Verdana" panose="020B0604030504040204" pitchFamily="34" charset="0"/>
+              </a:rPr>
+              <a:t>daily</a:t>
+            </a:r>
+            <a:r>
+              <a:rPr lang="nl-NL" sz="1600" dirty="0">
+                <a:solidFill>
+                  <a:schemeClr val="bg1">
+                    <a:lumMod val="50000"/>
+                  </a:schemeClr>
+                </a:solidFill>
+                <a:latin typeface="Verdana" panose="020B0604030504040204" pitchFamily="34" charset="0"/>
+                <a:ea typeface="Verdana" panose="020B0604030504040204" pitchFamily="34" charset="0"/>
+              </a:rPr>
+              <a:t> basis. </a:t>
+            </a:r>
+            <a:r>
+              <a:rPr lang="nl-NL" sz="1600" dirty="0" err="1">
+                <a:solidFill>
+                  <a:schemeClr val="bg1">
+                    <a:lumMod val="50000"/>
+                  </a:schemeClr>
+                </a:solidFill>
+                <a:latin typeface="Verdana" panose="020B0604030504040204" pitchFamily="34" charset="0"/>
+                <a:ea typeface="Verdana" panose="020B0604030504040204" pitchFamily="34" charset="0"/>
+              </a:rPr>
+              <a:t>Note</a:t>
+            </a:r>
+            <a:r>
+              <a:rPr lang="nl-NL" sz="1600" dirty="0">
+                <a:solidFill>
+                  <a:schemeClr val="bg1">
+                    <a:lumMod val="50000"/>
+                  </a:schemeClr>
+                </a:solidFill>
+                <a:latin typeface="Verdana" panose="020B0604030504040204" pitchFamily="34" charset="0"/>
+                <a:ea typeface="Verdana" panose="020B0604030504040204" pitchFamily="34" charset="0"/>
+              </a:rPr>
+              <a:t> </a:t>
+            </a:r>
+            <a:r>
+              <a:rPr lang="nl-NL" sz="1600" dirty="0" err="1">
+                <a:solidFill>
+                  <a:schemeClr val="bg1">
+                    <a:lumMod val="50000"/>
+                  </a:schemeClr>
+                </a:solidFill>
+                <a:latin typeface="Verdana" panose="020B0604030504040204" pitchFamily="34" charset="0"/>
+                <a:ea typeface="Verdana" panose="020B0604030504040204" pitchFamily="34" charset="0"/>
+              </a:rPr>
+              <a:t>the</a:t>
+            </a:r>
+            <a:r>
+              <a:rPr lang="nl-NL" sz="1600" dirty="0">
+                <a:solidFill>
+                  <a:schemeClr val="bg1">
+                    <a:lumMod val="50000"/>
+                  </a:schemeClr>
+                </a:solidFill>
+                <a:latin typeface="Verdana" panose="020B0604030504040204" pitchFamily="34" charset="0"/>
+                <a:ea typeface="Verdana" panose="020B0604030504040204" pitchFamily="34" charset="0"/>
+              </a:rPr>
+              <a:t> high </a:t>
+            </a:r>
+            <a:r>
+              <a:rPr lang="nl-NL" sz="1600" dirty="0" err="1">
+                <a:solidFill>
+                  <a:schemeClr val="bg1">
+                    <a:lumMod val="50000"/>
+                  </a:schemeClr>
+                </a:solidFill>
+                <a:latin typeface="Verdana" panose="020B0604030504040204" pitchFamily="34" charset="0"/>
+                <a:ea typeface="Verdana" panose="020B0604030504040204" pitchFamily="34" charset="0"/>
+              </a:rPr>
+              <a:t>usage</a:t>
+            </a:r>
+            <a:r>
+              <a:rPr lang="nl-NL" sz="1600" dirty="0">
+                <a:solidFill>
+                  <a:schemeClr val="bg1">
+                    <a:lumMod val="50000"/>
+                  </a:schemeClr>
+                </a:solidFill>
+                <a:latin typeface="Verdana" panose="020B0604030504040204" pitchFamily="34" charset="0"/>
+                <a:ea typeface="Verdana" panose="020B0604030504040204" pitchFamily="34" charset="0"/>
+              </a:rPr>
+              <a:t> of </a:t>
+            </a:r>
+            <a:r>
+              <a:rPr lang="nl-NL" sz="1600" dirty="0" err="1">
+                <a:solidFill>
+                  <a:schemeClr val="bg1">
+                    <a:lumMod val="50000"/>
+                  </a:schemeClr>
+                </a:solidFill>
+                <a:latin typeface="Verdana" panose="020B0604030504040204" pitchFamily="34" charset="0"/>
+                <a:ea typeface="Verdana" panose="020B0604030504040204" pitchFamily="34" charset="0"/>
+              </a:rPr>
+              <a:t>the</a:t>
+            </a:r>
+            <a:r>
+              <a:rPr lang="nl-NL" sz="1600" dirty="0">
+                <a:solidFill>
+                  <a:schemeClr val="bg1">
+                    <a:lumMod val="50000"/>
+                  </a:schemeClr>
+                </a:solidFill>
+                <a:latin typeface="Verdana" panose="020B0604030504040204" pitchFamily="34" charset="0"/>
+                <a:ea typeface="Verdana" panose="020B0604030504040204" pitchFamily="34" charset="0"/>
+              </a:rPr>
+              <a:t> </a:t>
+            </a:r>
+            <a:r>
+              <a:rPr lang="nl-NL" sz="1600" dirty="0" err="1">
+                <a:solidFill>
+                  <a:schemeClr val="bg1">
+                    <a:lumMod val="50000"/>
+                  </a:schemeClr>
+                </a:solidFill>
+                <a:latin typeface="Verdana" panose="020B0604030504040204" pitchFamily="34" charset="0"/>
+                <a:ea typeface="Verdana" panose="020B0604030504040204" pitchFamily="34" charset="0"/>
+              </a:rPr>
+              <a:t>lowest</a:t>
+            </a:r>
+            <a:r>
+              <a:rPr lang="nl-NL" sz="1600" dirty="0">
+                <a:solidFill>
+                  <a:schemeClr val="bg1">
+                    <a:lumMod val="50000"/>
+                  </a:schemeClr>
+                </a:solidFill>
+                <a:latin typeface="Verdana" panose="020B0604030504040204" pitchFamily="34" charset="0"/>
+                <a:ea typeface="Verdana" panose="020B0604030504040204" pitchFamily="34" charset="0"/>
+              </a:rPr>
+              <a:t> </a:t>
+            </a:r>
+            <a:r>
+              <a:rPr lang="nl-NL" sz="1600" dirty="0" err="1">
+                <a:solidFill>
+                  <a:schemeClr val="bg1">
+                    <a:lumMod val="50000"/>
+                  </a:schemeClr>
+                </a:solidFill>
+                <a:latin typeface="Verdana" panose="020B0604030504040204" pitchFamily="34" charset="0"/>
+                <a:ea typeface="Verdana" panose="020B0604030504040204" pitchFamily="34" charset="0"/>
+              </a:rPr>
+              <a:t>income</a:t>
+            </a:r>
+            <a:r>
+              <a:rPr lang="nl-NL" sz="1600" dirty="0">
+                <a:solidFill>
+                  <a:schemeClr val="bg1">
+                    <a:lumMod val="50000"/>
+                  </a:schemeClr>
+                </a:solidFill>
+                <a:latin typeface="Verdana" panose="020B0604030504040204" pitchFamily="34" charset="0"/>
+                <a:ea typeface="Verdana" panose="020B0604030504040204" pitchFamily="34" charset="0"/>
+              </a:rPr>
+              <a:t> </a:t>
+            </a:r>
+            <a:r>
+              <a:rPr lang="nl-NL" sz="1600" dirty="0" err="1">
+                <a:solidFill>
+                  <a:schemeClr val="bg1">
+                    <a:lumMod val="50000"/>
+                  </a:schemeClr>
+                </a:solidFill>
+                <a:latin typeface="Verdana" panose="020B0604030504040204" pitchFamily="34" charset="0"/>
+                <a:ea typeface="Verdana" panose="020B0604030504040204" pitchFamily="34" charset="0"/>
+              </a:rPr>
+              <a:t>group</a:t>
+            </a:r>
+            <a:r>
+              <a:rPr lang="en-GB" sz="1600" dirty="0">
+                <a:solidFill>
+                  <a:schemeClr val="bg1">
+                    <a:lumMod val="50000"/>
+                  </a:schemeClr>
+                </a:solidFill>
+                <a:latin typeface="Verdana" panose="020B0604030504040204" pitchFamily="34" charset="0"/>
+                <a:ea typeface="Verdana" panose="020B0604030504040204" pitchFamily="34" charset="0"/>
+              </a:rPr>
+              <a:t>.</a:t>
+            </a:r>
+            <a:endParaRPr lang="nl-NL" sz="1600" dirty="0">
+              <a:solidFill>
+                <a:schemeClr val="bg1">
+                  <a:lumMod val="50000"/>
                 </a:schemeClr>
               </a:solidFill>
               <a:latin typeface="Verdana" panose="020B0604030504040204" pitchFamily="34" charset="0"/>

</xml_diff>